<commit_message>
Include batchTableBinary and some misc updates
</commit_message>
<xml_diff>
--- a/TileFormats/Batched3DModel/figures/Figures.pptx
+++ b/TileFormats/Batched3DModel/figures/Figures.pptx
@@ -7,7 +7,7 @@
   <p:sldIdLst>
     <p:sldId id="256" r:id="rId2"/>
   </p:sldIdLst>
-  <p:sldSz cx="9144000" cy="6858000" type="screen4x3"/>
+  <p:sldSz cx="10972800" cy="6858000"/>
   <p:notesSz cx="6858000" cy="9144000"/>
   <p:defaultTextStyle>
     <a:defPPr>
@@ -107,12 +107,12 @@
   <p:extLst>
     <p:ext uri="{EFAFB233-063F-42B5-8137-9DF3F51BA10A}">
       <p15:sldGuideLst xmlns:p15="http://schemas.microsoft.com/office/powerpoint/2012/main">
-        <p15:guide id="1" orient="horz" pos="2160">
+        <p15:guide id="1" orient="horz" pos="2160" userDrawn="1">
           <p15:clr>
             <a:srgbClr val="A4A3A4"/>
           </p15:clr>
         </p15:guide>
-        <p15:guide id="2" pos="2880">
+        <p15:guide id="2" pos="3456" userDrawn="1">
           <p15:clr>
             <a:srgbClr val="A4A3A4"/>
           </p15:clr>
@@ -152,8 +152,8 @@
         </p:nvSpPr>
         <p:spPr>
           <a:xfrm>
-            <a:off x="685800" y="2130425"/>
-            <a:ext cx="7772400" cy="1470025"/>
+            <a:off x="822960" y="2130426"/>
+            <a:ext cx="9326880" cy="1470025"/>
           </a:xfrm>
         </p:spPr>
         <p:txBody>
@@ -180,8 +180,8 @@
         </p:nvSpPr>
         <p:spPr>
           <a:xfrm>
-            <a:off x="1371600" y="3886200"/>
-            <a:ext cx="6400800" cy="1752600"/>
+            <a:off x="1645920" y="3886200"/>
+            <a:ext cx="7680960" cy="1752600"/>
           </a:xfrm>
         </p:spPr>
         <p:txBody>
@@ -304,7 +304,7 @@
           <a:p>
             <a:fld id="{E44376AC-B3C2-8643-B9A3-A6905164CDF3}" type="datetimeFigureOut">
               <a:rPr lang="en-US" smtClean="0"/>
-              <a:t>11/7/2015</a:t>
+              <a:t>8/31/2016</a:t>
             </a:fld>
             <a:endParaRPr lang="en-US"/>
           </a:p>
@@ -474,7 +474,7 @@
           <a:p>
             <a:fld id="{E44376AC-B3C2-8643-B9A3-A6905164CDF3}" type="datetimeFigureOut">
               <a:rPr lang="en-US" smtClean="0"/>
-              <a:t>11/7/2015</a:t>
+              <a:t>8/31/2016</a:t>
             </a:fld>
             <a:endParaRPr lang="en-US"/>
           </a:p>
@@ -564,8 +564,8 @@
         </p:nvSpPr>
         <p:spPr>
           <a:xfrm>
-            <a:off x="6629400" y="274638"/>
-            <a:ext cx="2057400" cy="5851525"/>
+            <a:off x="7955280" y="274639"/>
+            <a:ext cx="2468880" cy="5851525"/>
           </a:xfrm>
         </p:spPr>
         <p:txBody>
@@ -592,8 +592,8 @@
         </p:nvSpPr>
         <p:spPr>
           <a:xfrm>
-            <a:off x="457200" y="274638"/>
-            <a:ext cx="6019800" cy="5851525"/>
+            <a:off x="548640" y="274639"/>
+            <a:ext cx="7223760" cy="5851525"/>
           </a:xfrm>
         </p:spPr>
         <p:txBody>
@@ -654,7 +654,7 @@
           <a:p>
             <a:fld id="{E44376AC-B3C2-8643-B9A3-A6905164CDF3}" type="datetimeFigureOut">
               <a:rPr lang="en-US" smtClean="0"/>
-              <a:t>11/7/2015</a:t>
+              <a:t>8/31/2016</a:t>
             </a:fld>
             <a:endParaRPr lang="en-US"/>
           </a:p>
@@ -824,7 +824,7 @@
           <a:p>
             <a:fld id="{E44376AC-B3C2-8643-B9A3-A6905164CDF3}" type="datetimeFigureOut">
               <a:rPr lang="en-US" smtClean="0"/>
-              <a:t>11/7/2015</a:t>
+              <a:t>8/31/2016</a:t>
             </a:fld>
             <a:endParaRPr lang="en-US"/>
           </a:p>
@@ -914,8 +914,8 @@
         </p:nvSpPr>
         <p:spPr>
           <a:xfrm>
-            <a:off x="722313" y="4406900"/>
-            <a:ext cx="7772400" cy="1362075"/>
+            <a:off x="866776" y="4406901"/>
+            <a:ext cx="9326880" cy="1362075"/>
           </a:xfrm>
         </p:spPr>
         <p:txBody>
@@ -946,8 +946,8 @@
         </p:nvSpPr>
         <p:spPr>
           <a:xfrm>
-            <a:off x="722313" y="2906713"/>
-            <a:ext cx="7772400" cy="1500187"/>
+            <a:off x="866776" y="2906713"/>
+            <a:ext cx="9326880" cy="1500187"/>
           </a:xfrm>
         </p:spPr>
         <p:txBody>
@@ -1070,7 +1070,7 @@
           <a:p>
             <a:fld id="{E44376AC-B3C2-8643-B9A3-A6905164CDF3}" type="datetimeFigureOut">
               <a:rPr lang="en-US" smtClean="0"/>
-              <a:t>11/7/2015</a:t>
+              <a:t>8/31/2016</a:t>
             </a:fld>
             <a:endParaRPr lang="en-US"/>
           </a:p>
@@ -1183,8 +1183,8 @@
         </p:nvSpPr>
         <p:spPr>
           <a:xfrm>
-            <a:off x="457200" y="1600200"/>
-            <a:ext cx="4038600" cy="4525963"/>
+            <a:off x="548640" y="1600201"/>
+            <a:ext cx="4846320" cy="4525963"/>
           </a:xfrm>
         </p:spPr>
         <p:txBody>
@@ -1268,8 +1268,8 @@
         </p:nvSpPr>
         <p:spPr>
           <a:xfrm>
-            <a:off x="4648200" y="1600200"/>
-            <a:ext cx="4038600" cy="4525963"/>
+            <a:off x="5577840" y="1600201"/>
+            <a:ext cx="4846320" cy="4525963"/>
           </a:xfrm>
         </p:spPr>
         <p:txBody>
@@ -1358,7 +1358,7 @@
           <a:p>
             <a:fld id="{E44376AC-B3C2-8643-B9A3-A6905164CDF3}" type="datetimeFigureOut">
               <a:rPr lang="en-US" smtClean="0"/>
-              <a:t>11/7/2015</a:t>
+              <a:t>8/31/2016</a:t>
             </a:fld>
             <a:endParaRPr lang="en-US"/>
           </a:p>
@@ -1475,8 +1475,8 @@
         </p:nvSpPr>
         <p:spPr>
           <a:xfrm>
-            <a:off x="457200" y="1535113"/>
-            <a:ext cx="4040188" cy="639762"/>
+            <a:off x="548640" y="1535113"/>
+            <a:ext cx="4848226" cy="639762"/>
           </a:xfrm>
         </p:spPr>
         <p:txBody>
@@ -1540,8 +1540,8 @@
         </p:nvSpPr>
         <p:spPr>
           <a:xfrm>
-            <a:off x="457200" y="2174875"/>
-            <a:ext cx="4040188" cy="3951288"/>
+            <a:off x="548640" y="2174875"/>
+            <a:ext cx="4848226" cy="3951288"/>
           </a:xfrm>
         </p:spPr>
         <p:txBody>
@@ -1625,8 +1625,8 @@
         </p:nvSpPr>
         <p:spPr>
           <a:xfrm>
-            <a:off x="4645025" y="1535113"/>
-            <a:ext cx="4041775" cy="639762"/>
+            <a:off x="5574031" y="1535113"/>
+            <a:ext cx="4850130" cy="639762"/>
           </a:xfrm>
         </p:spPr>
         <p:txBody>
@@ -1690,8 +1690,8 @@
         </p:nvSpPr>
         <p:spPr>
           <a:xfrm>
-            <a:off x="4645025" y="2174875"/>
-            <a:ext cx="4041775" cy="3951288"/>
+            <a:off x="5574031" y="2174875"/>
+            <a:ext cx="4850130" cy="3951288"/>
           </a:xfrm>
         </p:spPr>
         <p:txBody>
@@ -1780,7 +1780,7 @@
           <a:p>
             <a:fld id="{E44376AC-B3C2-8643-B9A3-A6905164CDF3}" type="datetimeFigureOut">
               <a:rPr lang="en-US" smtClean="0"/>
-              <a:t>11/7/2015</a:t>
+              <a:t>8/31/2016</a:t>
             </a:fld>
             <a:endParaRPr lang="en-US"/>
           </a:p>
@@ -1898,7 +1898,7 @@
           <a:p>
             <a:fld id="{E44376AC-B3C2-8643-B9A3-A6905164CDF3}" type="datetimeFigureOut">
               <a:rPr lang="en-US" smtClean="0"/>
-              <a:t>11/7/2015</a:t>
+              <a:t>8/31/2016</a:t>
             </a:fld>
             <a:endParaRPr lang="en-US"/>
           </a:p>
@@ -1993,7 +1993,7 @@
           <a:p>
             <a:fld id="{E44376AC-B3C2-8643-B9A3-A6905164CDF3}" type="datetimeFigureOut">
               <a:rPr lang="en-US" smtClean="0"/>
-              <a:t>11/7/2015</a:t>
+              <a:t>8/31/2016</a:t>
             </a:fld>
             <a:endParaRPr lang="en-US"/>
           </a:p>
@@ -2083,8 +2083,8 @@
         </p:nvSpPr>
         <p:spPr>
           <a:xfrm>
-            <a:off x="457200" y="273050"/>
-            <a:ext cx="3008313" cy="1162050"/>
+            <a:off x="548640" y="273050"/>
+            <a:ext cx="3609976" cy="1162050"/>
           </a:xfrm>
         </p:spPr>
         <p:txBody>
@@ -2115,8 +2115,8 @@
         </p:nvSpPr>
         <p:spPr>
           <a:xfrm>
-            <a:off x="3575050" y="273050"/>
-            <a:ext cx="5111750" cy="5853113"/>
+            <a:off x="4290060" y="273051"/>
+            <a:ext cx="6134100" cy="5853113"/>
           </a:xfrm>
         </p:spPr>
         <p:txBody>
@@ -2200,8 +2200,8 @@
         </p:nvSpPr>
         <p:spPr>
           <a:xfrm>
-            <a:off x="457200" y="1435100"/>
-            <a:ext cx="3008313" cy="4691063"/>
+            <a:off x="548640" y="1435101"/>
+            <a:ext cx="3609976" cy="4691063"/>
           </a:xfrm>
         </p:spPr>
         <p:txBody>
@@ -2270,7 +2270,7 @@
           <a:p>
             <a:fld id="{E44376AC-B3C2-8643-B9A3-A6905164CDF3}" type="datetimeFigureOut">
               <a:rPr lang="en-US" smtClean="0"/>
-              <a:t>11/7/2015</a:t>
+              <a:t>8/31/2016</a:t>
             </a:fld>
             <a:endParaRPr lang="en-US"/>
           </a:p>
@@ -2360,8 +2360,8 @@
         </p:nvSpPr>
         <p:spPr>
           <a:xfrm>
-            <a:off x="1792288" y="4800600"/>
-            <a:ext cx="5486400" cy="566738"/>
+            <a:off x="2150746" y="4800600"/>
+            <a:ext cx="6583680" cy="566738"/>
           </a:xfrm>
         </p:spPr>
         <p:txBody>
@@ -2392,8 +2392,8 @@
         </p:nvSpPr>
         <p:spPr>
           <a:xfrm>
-            <a:off x="1792288" y="612775"/>
-            <a:ext cx="5486400" cy="4114800"/>
+            <a:off x="2150746" y="612775"/>
+            <a:ext cx="6583680" cy="4114800"/>
           </a:xfrm>
         </p:spPr>
         <p:txBody>
@@ -2453,8 +2453,8 @@
         </p:nvSpPr>
         <p:spPr>
           <a:xfrm>
-            <a:off x="1792288" y="5367338"/>
-            <a:ext cx="5486400" cy="804862"/>
+            <a:off x="2150746" y="5367338"/>
+            <a:ext cx="6583680" cy="804862"/>
           </a:xfrm>
         </p:spPr>
         <p:txBody>
@@ -2523,7 +2523,7 @@
           <a:p>
             <a:fld id="{E44376AC-B3C2-8643-B9A3-A6905164CDF3}" type="datetimeFigureOut">
               <a:rPr lang="en-US" smtClean="0"/>
-              <a:t>11/7/2015</a:t>
+              <a:t>8/31/2016</a:t>
             </a:fld>
             <a:endParaRPr lang="en-US"/>
           </a:p>
@@ -2618,8 +2618,8 @@
         </p:nvSpPr>
         <p:spPr>
           <a:xfrm>
-            <a:off x="457200" y="274638"/>
-            <a:ext cx="8229600" cy="1143000"/>
+            <a:off x="548640" y="274638"/>
+            <a:ext cx="9875520" cy="1143000"/>
           </a:xfrm>
           <a:prstGeom prst="rect">
             <a:avLst/>
@@ -2651,8 +2651,8 @@
         </p:nvSpPr>
         <p:spPr>
           <a:xfrm>
-            <a:off x="457200" y="1600200"/>
-            <a:ext cx="8229600" cy="4525963"/>
+            <a:off x="548640" y="1600201"/>
+            <a:ext cx="9875520" cy="4525963"/>
           </a:xfrm>
           <a:prstGeom prst="rect">
             <a:avLst/>
@@ -2713,8 +2713,8 @@
         </p:nvSpPr>
         <p:spPr>
           <a:xfrm>
-            <a:off x="457200" y="6356350"/>
-            <a:ext cx="2133600" cy="365125"/>
+            <a:off x="548640" y="6356351"/>
+            <a:ext cx="2560320" cy="365125"/>
           </a:xfrm>
           <a:prstGeom prst="rect">
             <a:avLst/>
@@ -2736,7 +2736,7 @@
           <a:p>
             <a:fld id="{E44376AC-B3C2-8643-B9A3-A6905164CDF3}" type="datetimeFigureOut">
               <a:rPr lang="en-US" smtClean="0"/>
-              <a:t>11/7/2015</a:t>
+              <a:t>8/31/2016</a:t>
             </a:fld>
             <a:endParaRPr lang="en-US"/>
           </a:p>
@@ -2754,8 +2754,8 @@
         </p:nvSpPr>
         <p:spPr>
           <a:xfrm>
-            <a:off x="3124200" y="6356350"/>
-            <a:ext cx="2895600" cy="365125"/>
+            <a:off x="3749040" y="6356351"/>
+            <a:ext cx="3474720" cy="365125"/>
           </a:xfrm>
           <a:prstGeom prst="rect">
             <a:avLst/>
@@ -2791,8 +2791,8 @@
         </p:nvSpPr>
         <p:spPr>
           <a:xfrm>
-            <a:off x="6553200" y="6356350"/>
-            <a:ext cx="2133600" cy="365125"/>
+            <a:off x="7863840" y="6356351"/>
+            <a:ext cx="2560320" cy="365125"/>
           </a:xfrm>
           <a:prstGeom prst="rect">
             <a:avLst/>
@@ -3119,7 +3119,7 @@
         </p:nvSpPr>
         <p:spPr>
           <a:xfrm>
-            <a:off x="195825" y="668709"/>
+            <a:off x="642711" y="668710"/>
             <a:ext cx="1846930" cy="461665"/>
           </a:xfrm>
           <a:prstGeom prst="rect">
@@ -3147,7 +3147,7 @@
               <a:t>m</a:t>
             </a:r>
             <a:r>
-              <a:rPr lang="en-US" sz="1200" dirty="0" smtClean="0">
+              <a:rPr lang="en-US" sz="1200" dirty="0">
                 <a:latin typeface="Courier New"/>
                 <a:cs typeface="Courier New"/>
               </a:rPr>
@@ -3157,14 +3157,14 @@
           <a:p>
             <a:pPr algn="ctr"/>
             <a:r>
-              <a:rPr lang="en-US" sz="1200" dirty="0" smtClean="0">
+              <a:rPr lang="en-US" sz="1200" dirty="0">
                 <a:latin typeface="Courier New"/>
                 <a:cs typeface="Courier New"/>
               </a:rPr>
               <a:t>(</a:t>
             </a:r>
             <a:r>
-              <a:rPr lang="en-US" sz="1200" dirty="0" smtClean="0">
+              <a:rPr lang="en-US" sz="1200" dirty="0">
                 <a:solidFill>
                   <a:srgbClr val="558ED5"/>
                 </a:solidFill>
@@ -3174,7 +3174,7 @@
               <a:t>unsigned char</a:t>
             </a:r>
             <a:r>
-              <a:rPr lang="en-US" sz="1200" dirty="0" smtClean="0">
+              <a:rPr lang="en-US" sz="1200" dirty="0">
                 <a:latin typeface="Courier New"/>
                 <a:cs typeface="Courier New"/>
               </a:rPr>
@@ -3195,7 +3195,7 @@
         </p:nvSpPr>
         <p:spPr>
           <a:xfrm>
-            <a:off x="2042755" y="668709"/>
+            <a:off x="2489641" y="668710"/>
             <a:ext cx="923450" cy="461665"/>
           </a:xfrm>
           <a:prstGeom prst="rect">
@@ -3216,7 +3216,7 @@
           <a:p>
             <a:pPr algn="ctr"/>
             <a:r>
-              <a:rPr lang="en-US" sz="1200" dirty="0" smtClean="0">
+              <a:rPr lang="en-US" sz="1200" dirty="0">
                 <a:latin typeface="Courier New"/>
                 <a:cs typeface="Courier New"/>
               </a:rPr>
@@ -3226,14 +3226,14 @@
           <a:p>
             <a:pPr algn="ctr"/>
             <a:r>
-              <a:rPr lang="en-US" sz="1200" dirty="0" smtClean="0">
+              <a:rPr lang="en-US" sz="1200" dirty="0">
                 <a:latin typeface="Courier New"/>
                 <a:cs typeface="Courier New"/>
               </a:rPr>
               <a:t>(</a:t>
             </a:r>
             <a:r>
-              <a:rPr lang="en-US" sz="1200" dirty="0" smtClean="0">
+              <a:rPr lang="en-US" sz="1200" dirty="0">
                 <a:solidFill>
                   <a:schemeClr val="tx2">
                     <a:lumMod val="60000"/>
@@ -3246,7 +3246,7 @@
               <a:t>uint32</a:t>
             </a:r>
             <a:r>
-              <a:rPr lang="en-US" sz="1200" dirty="0" smtClean="0">
+              <a:rPr lang="en-US" sz="1200" dirty="0">
                 <a:latin typeface="Courier New"/>
                 <a:cs typeface="Courier New"/>
               </a:rPr>
@@ -3267,7 +3267,7 @@
         </p:nvSpPr>
         <p:spPr>
           <a:xfrm>
-            <a:off x="1381117" y="2111194"/>
+            <a:off x="1763474" y="1965895"/>
             <a:ext cx="1207382" cy="461665"/>
           </a:xfrm>
           <a:prstGeom prst="rect">
@@ -3288,7 +3288,7 @@
           <a:p>
             <a:pPr algn="ctr"/>
             <a:r>
-              <a:rPr lang="en-US" sz="1200" dirty="0" smtClean="0">
+              <a:rPr lang="en-US" sz="1200" dirty="0">
                 <a:latin typeface="Courier New"/>
                 <a:cs typeface="Courier New"/>
               </a:rPr>
@@ -3297,7 +3297,7 @@
           </a:p>
           <a:p>
             <a:pPr algn="ctr"/>
-            <a:endParaRPr lang="en-US" sz="1200" dirty="0" smtClean="0">
+            <a:endParaRPr lang="en-US" sz="1200" dirty="0">
               <a:latin typeface="Courier New"/>
               <a:cs typeface="Courier New"/>
             </a:endParaRPr>
@@ -3312,7 +3312,7 @@
         </p:nvSpPr>
         <p:spPr>
           <a:xfrm>
-            <a:off x="1317330" y="2963793"/>
+            <a:off x="1692813" y="2818493"/>
             <a:ext cx="1342573" cy="616860"/>
           </a:xfrm>
           <a:prstGeom prst="ellipse">
@@ -3342,7 +3342,7 @@
           <a:p>
             <a:pPr algn="ctr"/>
             <a:r>
-              <a:rPr lang="en-US" sz="1200" dirty="0" smtClean="0">
+              <a:rPr lang="en-US" sz="1200" dirty="0">
                 <a:latin typeface="Courier New"/>
                 <a:cs typeface="Courier New"/>
               </a:rPr>
@@ -3363,8 +3363,8 @@
         </p:nvCxnSpPr>
         <p:spPr>
           <a:xfrm>
-            <a:off x="195825" y="405940"/>
-            <a:ext cx="7142806" cy="0"/>
+            <a:off x="642711" y="405940"/>
+            <a:ext cx="10116697" cy="0"/>
           </a:xfrm>
           <a:prstGeom prst="straightConnector1">
             <a:avLst/>
@@ -3400,7 +3400,7 @@
         </p:nvSpPr>
         <p:spPr>
           <a:xfrm>
-            <a:off x="3024076" y="128941"/>
+            <a:off x="4743248" y="128942"/>
             <a:ext cx="1486305" cy="276999"/>
           </a:xfrm>
           <a:prstGeom prst="rect">
@@ -3420,11 +3420,11 @@
           <a:p>
             <a:pPr algn="ctr"/>
             <a:r>
-              <a:rPr lang="en-US" sz="1200" dirty="0" smtClean="0">
+              <a:rPr lang="en-US" sz="1200" dirty="0">
                 <a:latin typeface="Courier New"/>
                 <a:cs typeface="Courier New"/>
               </a:rPr>
-              <a:t>20-byte header</a:t>
+              <a:t>24-byte header</a:t>
             </a:r>
             <a:endParaRPr lang="en-US" sz="1200" dirty="0">
               <a:latin typeface="Courier New"/>
@@ -3443,9 +3443,9 @@
           <p:nvPr/>
         </p:nvCxnSpPr>
         <p:spPr>
-          <a:xfrm>
-            <a:off x="1984808" y="2572859"/>
-            <a:ext cx="3809" cy="390934"/>
+          <a:xfrm flipH="1">
+            <a:off x="2364100" y="2427560"/>
+            <a:ext cx="3065" cy="390933"/>
           </a:xfrm>
           <a:prstGeom prst="straightConnector1">
             <a:avLst/>
@@ -3481,8 +3481,8 @@
         </p:nvSpPr>
         <p:spPr>
           <a:xfrm>
-            <a:off x="5294481" y="668708"/>
-            <a:ext cx="2044150" cy="461665"/>
+            <a:off x="4533344" y="668709"/>
+            <a:ext cx="2416046" cy="461665"/>
           </a:xfrm>
           <a:prstGeom prst="rect">
             <a:avLst/>
@@ -3506,9 +3506,9 @@
                 <a:latin typeface="Courier New"/>
                 <a:cs typeface="Courier New"/>
               </a:rPr>
-              <a:t>batchTableByteLength</a:t>
-            </a:r>
-            <a:endParaRPr lang="en-US" sz="1200" dirty="0" smtClean="0">
+              <a:t>batchTableJSONByteLength</a:t>
+            </a:r>
+            <a:endParaRPr lang="en-US" sz="1200" dirty="0">
               <a:latin typeface="Courier New"/>
               <a:cs typeface="Courier New"/>
             </a:endParaRPr>
@@ -3516,14 +3516,14 @@
           <a:p>
             <a:pPr algn="ctr"/>
             <a:r>
-              <a:rPr lang="en-US" sz="1200" dirty="0" smtClean="0">
+              <a:rPr lang="en-US" sz="1200" dirty="0">
                 <a:latin typeface="Courier New"/>
                 <a:cs typeface="Courier New"/>
               </a:rPr>
               <a:t>(</a:t>
             </a:r>
             <a:r>
-              <a:rPr lang="en-US" sz="1200" dirty="0" smtClean="0">
+              <a:rPr lang="en-US" sz="1200" dirty="0">
                 <a:solidFill>
                   <a:schemeClr val="tx2">
                     <a:lumMod val="60000"/>
@@ -3536,7 +3536,7 @@
               <a:t>uint32</a:t>
             </a:r>
             <a:r>
-              <a:rPr lang="en-US" sz="1200" dirty="0" smtClean="0">
+              <a:rPr lang="en-US" sz="1200" dirty="0">
                 <a:latin typeface="Courier New"/>
                 <a:cs typeface="Courier New"/>
               </a:rPr>
@@ -3557,7 +3557,7 @@
         </p:nvSpPr>
         <p:spPr>
           <a:xfrm>
-            <a:off x="267229" y="2111194"/>
+            <a:off x="642711" y="1965895"/>
             <a:ext cx="1114408" cy="461665"/>
           </a:xfrm>
           <a:prstGeom prst="rect">
@@ -3579,7 +3579,7 @@
           <a:p>
             <a:pPr algn="ctr"/>
             <a:r>
-              <a:rPr lang="en-US" sz="1200" dirty="0" smtClean="0">
+              <a:rPr lang="en-US" sz="1200" dirty="0">
                 <a:latin typeface="Courier New"/>
                 <a:cs typeface="Courier New"/>
               </a:rPr>
@@ -3603,7 +3603,7 @@
         </p:nvSpPr>
         <p:spPr>
           <a:xfrm>
-            <a:off x="2966205" y="668709"/>
+            <a:off x="3413091" y="668710"/>
             <a:ext cx="1114408" cy="461665"/>
           </a:xfrm>
           <a:prstGeom prst="rect">
@@ -3624,7 +3624,7 @@
           <a:p>
             <a:pPr algn="ctr"/>
             <a:r>
-              <a:rPr lang="en-US" sz="1200" dirty="0" smtClean="0">
+              <a:rPr lang="en-US" sz="1200" dirty="0">
                 <a:latin typeface="Courier New"/>
                 <a:cs typeface="Courier New"/>
               </a:rPr>
@@ -3634,14 +3634,14 @@
           <a:p>
             <a:pPr algn="ctr"/>
             <a:r>
-              <a:rPr lang="en-US" sz="1200" dirty="0" smtClean="0">
+              <a:rPr lang="en-US" sz="1200" dirty="0">
                 <a:latin typeface="Courier New"/>
                 <a:cs typeface="Courier New"/>
               </a:rPr>
               <a:t>(</a:t>
             </a:r>
             <a:r>
-              <a:rPr lang="en-US" sz="1200" dirty="0" smtClean="0">
+              <a:rPr lang="en-US" sz="1200" dirty="0">
                 <a:solidFill>
                   <a:schemeClr val="tx2">
                     <a:lumMod val="60000"/>
@@ -3654,7 +3654,7 @@
               <a:t>uint32</a:t>
             </a:r>
             <a:r>
-              <a:rPr lang="en-US" sz="1200" dirty="0" smtClean="0">
+              <a:rPr lang="en-US" sz="1200" dirty="0">
                 <a:latin typeface="Courier New"/>
                 <a:cs typeface="Courier New"/>
               </a:rPr>
@@ -3675,7 +3675,7 @@
         </p:nvSpPr>
         <p:spPr>
           <a:xfrm>
-            <a:off x="4087099" y="668709"/>
+            <a:off x="9551385" y="668707"/>
             <a:ext cx="1207382" cy="461665"/>
           </a:xfrm>
           <a:prstGeom prst="rect">
@@ -3696,7 +3696,7 @@
           <a:p>
             <a:pPr algn="ctr"/>
             <a:r>
-              <a:rPr lang="en-US" sz="1200" dirty="0" smtClean="0">
+              <a:rPr lang="en-US" sz="1200" dirty="0">
                 <a:latin typeface="Courier New"/>
                 <a:cs typeface="Courier New"/>
               </a:rPr>
@@ -3706,14 +3706,14 @@
           <a:p>
             <a:pPr algn="ctr"/>
             <a:r>
-              <a:rPr lang="en-US" sz="1200" dirty="0" smtClean="0">
+              <a:rPr lang="en-US" sz="1200" dirty="0">
                 <a:latin typeface="Courier New"/>
                 <a:cs typeface="Courier New"/>
               </a:rPr>
               <a:t>(</a:t>
             </a:r>
             <a:r>
-              <a:rPr lang="en-US" sz="1200" dirty="0" smtClean="0">
+              <a:rPr lang="en-US" sz="1200" dirty="0">
                 <a:solidFill>
                   <a:schemeClr val="tx2">
                     <a:lumMod val="60000"/>
@@ -3726,7 +3726,7 @@
               <a:t>uint32</a:t>
             </a:r>
             <a:r>
-              <a:rPr lang="en-US" sz="1200" dirty="0" smtClean="0">
+              <a:rPr lang="en-US" sz="1200" dirty="0">
                 <a:latin typeface="Courier New"/>
                 <a:cs typeface="Courier New"/>
               </a:rPr>
@@ -3747,7 +3747,7 @@
         </p:nvCxnSpPr>
         <p:spPr>
           <a:xfrm>
-            <a:off x="267229" y="1858222"/>
+            <a:off x="642711" y="1705112"/>
             <a:ext cx="2321270" cy="0"/>
           </a:xfrm>
           <a:prstGeom prst="straightConnector1">
@@ -3784,7 +3784,7 @@
         </p:nvSpPr>
         <p:spPr>
           <a:xfrm>
-            <a:off x="1149582" y="1518726"/>
+            <a:off x="1525065" y="1365617"/>
             <a:ext cx="556563" cy="276999"/>
           </a:xfrm>
           <a:prstGeom prst="rect">
@@ -3804,16 +3804,95 @@
           <a:p>
             <a:pPr algn="ctr"/>
             <a:r>
+              <a:rPr lang="en-US" sz="1200" dirty="0">
+                <a:latin typeface="Courier New"/>
+                <a:cs typeface="Courier New"/>
+              </a:rPr>
+              <a:t>body</a:t>
+            </a:r>
+            <a:endParaRPr lang="en-US" sz="1200" dirty="0">
+              <a:latin typeface="Courier New"/>
+              <a:cs typeface="Courier New"/>
+            </a:endParaRPr>
+          </a:p>
+        </p:txBody>
+      </p:sp>
+      <p:sp>
+        <p:nvSpPr>
+          <p:cNvPr id="20" name="TextBox 19"/>
+          <p:cNvSpPr txBox="1"/>
+          <p:nvPr/>
+        </p:nvSpPr>
+        <p:spPr>
+          <a:xfrm>
+            <a:off x="6949390" y="668708"/>
+            <a:ext cx="2601995" cy="461665"/>
+          </a:xfrm>
+          <a:prstGeom prst="rect">
+            <a:avLst/>
+          </a:prstGeom>
+          <a:noFill/>
+          <a:ln w="12700" cmpd="sng">
+            <a:solidFill>
+              <a:schemeClr val="tx1"/>
+            </a:solidFill>
+          </a:ln>
+        </p:spPr>
+        <p:txBody>
+          <a:bodyPr wrap="none" rtlCol="0">
+            <a:spAutoFit/>
+          </a:bodyPr>
+          <a:lstStyle/>
+          <a:p>
+            <a:pPr algn="ctr"/>
+            <a:r>
               <a:rPr lang="en-US" sz="1200" dirty="0" smtClean="0">
                 <a:latin typeface="Courier New"/>
                 <a:cs typeface="Courier New"/>
               </a:rPr>
-              <a:t>body</a:t>
+              <a:t>batch</a:t>
+            </a:r>
+            <a:r>
+              <a:rPr lang="en-US" sz="1200" dirty="0" smtClean="0">
+                <a:latin typeface="Courier New"/>
+                <a:cs typeface="Courier New"/>
+              </a:rPr>
+              <a:t>TableBinaryByteLength</a:t>
             </a:r>
             <a:endParaRPr lang="en-US" sz="1200" dirty="0">
               <a:latin typeface="Courier New"/>
               <a:cs typeface="Courier New"/>
             </a:endParaRPr>
+          </a:p>
+          <a:p>
+            <a:pPr algn="ctr"/>
+            <a:r>
+              <a:rPr lang="en-US" sz="1200" dirty="0">
+                <a:latin typeface="Courier New"/>
+                <a:cs typeface="Courier New"/>
+              </a:rPr>
+              <a:t>(</a:t>
+            </a:r>
+            <a:r>
+              <a:rPr lang="en-US" sz="1200" dirty="0">
+                <a:solidFill>
+                  <a:schemeClr val="tx2">
+                    <a:lumMod val="60000"/>
+                    <a:lumOff val="40000"/>
+                  </a:schemeClr>
+                </a:solidFill>
+                <a:latin typeface="Courier New"/>
+                <a:cs typeface="Courier New"/>
+              </a:rPr>
+              <a:t>uint32</a:t>
+            </a:r>
+            <a:r>
+              <a:rPr lang="en-US" sz="1200" dirty="0">
+                <a:latin typeface="Courier New"/>
+                <a:cs typeface="Courier New"/>
+              </a:rPr>
+              <a:t>)</a:t>
+            </a:r>
           </a:p>
         </p:txBody>
       </p:sp>
@@ -3827,6 +3906,13 @@
   <p:clrMapOvr>
     <a:masterClrMapping/>
   </p:clrMapOvr>
+  <p:timing>
+    <p:tnLst>
+      <p:par>
+        <p:cTn id="1" dur="indefinite" restart="never" nodeType="tmRoot"/>
+      </p:par>
+    </p:tnLst>
+  </p:timing>
 </p:sld>
 </file>
 

</xml_diff>

<commit_message>
Add feature table to b3dm
</commit_message>
<xml_diff>
--- a/TileFormats/Batched3DModel/figures/Figures.pptx
+++ b/TileFormats/Batched3DModel/figures/Figures.pptx
@@ -304,7 +304,7 @@
           <a:p>
             <a:fld id="{E44376AC-B3C2-8643-B9A3-A6905164CDF3}" type="datetimeFigureOut">
               <a:rPr lang="en-US" smtClean="0"/>
-              <a:t>8/31/2016</a:t>
+              <a:t>3/28/2017</a:t>
             </a:fld>
             <a:endParaRPr lang="en-US"/>
           </a:p>
@@ -474,7 +474,7 @@
           <a:p>
             <a:fld id="{E44376AC-B3C2-8643-B9A3-A6905164CDF3}" type="datetimeFigureOut">
               <a:rPr lang="en-US" smtClean="0"/>
-              <a:t>8/31/2016</a:t>
+              <a:t>3/28/2017</a:t>
             </a:fld>
             <a:endParaRPr lang="en-US"/>
           </a:p>
@@ -654,7 +654,7 @@
           <a:p>
             <a:fld id="{E44376AC-B3C2-8643-B9A3-A6905164CDF3}" type="datetimeFigureOut">
               <a:rPr lang="en-US" smtClean="0"/>
-              <a:t>8/31/2016</a:t>
+              <a:t>3/28/2017</a:t>
             </a:fld>
             <a:endParaRPr lang="en-US"/>
           </a:p>
@@ -824,7 +824,7 @@
           <a:p>
             <a:fld id="{E44376AC-B3C2-8643-B9A3-A6905164CDF3}" type="datetimeFigureOut">
               <a:rPr lang="en-US" smtClean="0"/>
-              <a:t>8/31/2016</a:t>
+              <a:t>3/28/2017</a:t>
             </a:fld>
             <a:endParaRPr lang="en-US"/>
           </a:p>
@@ -1070,7 +1070,7 @@
           <a:p>
             <a:fld id="{E44376AC-B3C2-8643-B9A3-A6905164CDF3}" type="datetimeFigureOut">
               <a:rPr lang="en-US" smtClean="0"/>
-              <a:t>8/31/2016</a:t>
+              <a:t>3/28/2017</a:t>
             </a:fld>
             <a:endParaRPr lang="en-US"/>
           </a:p>
@@ -1358,7 +1358,7 @@
           <a:p>
             <a:fld id="{E44376AC-B3C2-8643-B9A3-A6905164CDF3}" type="datetimeFigureOut">
               <a:rPr lang="en-US" smtClean="0"/>
-              <a:t>8/31/2016</a:t>
+              <a:t>3/28/2017</a:t>
             </a:fld>
             <a:endParaRPr lang="en-US"/>
           </a:p>
@@ -1780,7 +1780,7 @@
           <a:p>
             <a:fld id="{E44376AC-B3C2-8643-B9A3-A6905164CDF3}" type="datetimeFigureOut">
               <a:rPr lang="en-US" smtClean="0"/>
-              <a:t>8/31/2016</a:t>
+              <a:t>3/28/2017</a:t>
             </a:fld>
             <a:endParaRPr lang="en-US"/>
           </a:p>
@@ -1898,7 +1898,7 @@
           <a:p>
             <a:fld id="{E44376AC-B3C2-8643-B9A3-A6905164CDF3}" type="datetimeFigureOut">
               <a:rPr lang="en-US" smtClean="0"/>
-              <a:t>8/31/2016</a:t>
+              <a:t>3/28/2017</a:t>
             </a:fld>
             <a:endParaRPr lang="en-US"/>
           </a:p>
@@ -1993,7 +1993,7 @@
           <a:p>
             <a:fld id="{E44376AC-B3C2-8643-B9A3-A6905164CDF3}" type="datetimeFigureOut">
               <a:rPr lang="en-US" smtClean="0"/>
-              <a:t>8/31/2016</a:t>
+              <a:t>3/28/2017</a:t>
             </a:fld>
             <a:endParaRPr lang="en-US"/>
           </a:p>
@@ -2270,7 +2270,7 @@
           <a:p>
             <a:fld id="{E44376AC-B3C2-8643-B9A3-A6905164CDF3}" type="datetimeFigureOut">
               <a:rPr lang="en-US" smtClean="0"/>
-              <a:t>8/31/2016</a:t>
+              <a:t>3/28/2017</a:t>
             </a:fld>
             <a:endParaRPr lang="en-US"/>
           </a:p>
@@ -2523,7 +2523,7 @@
           <a:p>
             <a:fld id="{E44376AC-B3C2-8643-B9A3-A6905164CDF3}" type="datetimeFigureOut">
               <a:rPr lang="en-US" smtClean="0"/>
-              <a:t>8/31/2016</a:t>
+              <a:t>3/28/2017</a:t>
             </a:fld>
             <a:endParaRPr lang="en-US"/>
           </a:p>
@@ -2736,7 +2736,7 @@
           <a:p>
             <a:fld id="{E44376AC-B3C2-8643-B9A3-A6905164CDF3}" type="datetimeFigureOut">
               <a:rPr lang="en-US" smtClean="0"/>
-              <a:t>8/31/2016</a:t>
+              <a:t>3/28/2017</a:t>
             </a:fld>
             <a:endParaRPr lang="en-US"/>
           </a:p>
@@ -3113,14 +3113,14 @@
       </p:grpSpPr>
       <p:sp>
         <p:nvSpPr>
-          <p:cNvPr id="4" name="TextBox 3"/>
+          <p:cNvPr id="22" name="TextBox 21"/>
           <p:cNvSpPr txBox="1"/>
           <p:nvPr/>
         </p:nvSpPr>
         <p:spPr>
           <a:xfrm>
-            <a:off x="642711" y="668710"/>
-            <a:ext cx="1846930" cy="461665"/>
+            <a:off x="229919" y="676739"/>
+            <a:ext cx="1569660" cy="400110"/>
           </a:xfrm>
           <a:prstGeom prst="rect">
             <a:avLst/>
@@ -3140,31 +3140,24 @@
           <a:p>
             <a:pPr algn="ctr"/>
             <a:r>
-              <a:rPr lang="en-US" sz="1200" dirty="0">
+              <a:rPr lang="en-US" sz="1000" dirty="0" smtClean="0">
                 <a:latin typeface="Courier New"/>
                 <a:cs typeface="Courier New"/>
               </a:rPr>
-              <a:t>m</a:t>
-            </a:r>
-            <a:r>
-              <a:rPr lang="en-US" sz="1200" dirty="0">
-                <a:latin typeface="Courier New"/>
-                <a:cs typeface="Courier New"/>
-              </a:rPr>
-              <a:t>agic</a:t>
+              <a:t>magic</a:t>
             </a:r>
           </a:p>
           <a:p>
             <a:pPr algn="ctr"/>
             <a:r>
-              <a:rPr lang="en-US" sz="1200" dirty="0">
+              <a:rPr lang="en-US" sz="1000" dirty="0" smtClean="0">
                 <a:latin typeface="Courier New"/>
                 <a:cs typeface="Courier New"/>
               </a:rPr>
               <a:t>(</a:t>
             </a:r>
             <a:r>
-              <a:rPr lang="en-US" sz="1200" dirty="0">
+              <a:rPr lang="en-US" sz="1000" dirty="0" smtClean="0">
                 <a:solidFill>
                   <a:srgbClr val="558ED5"/>
                 </a:solidFill>
@@ -3174,13 +3167,13 @@
               <a:t>unsigned char</a:t>
             </a:r>
             <a:r>
-              <a:rPr lang="en-US" sz="1200" dirty="0">
+              <a:rPr lang="en-US" sz="1000" dirty="0" smtClean="0">
                 <a:latin typeface="Courier New"/>
                 <a:cs typeface="Courier New"/>
               </a:rPr>
               <a:t>[4])</a:t>
             </a:r>
-            <a:endParaRPr lang="en-US" sz="1200" dirty="0">
+            <a:endParaRPr lang="en-US" sz="1000" dirty="0">
               <a:latin typeface="Courier New"/>
               <a:cs typeface="Courier New"/>
             </a:endParaRPr>
@@ -3189,14 +3182,14 @@
       </p:sp>
       <p:sp>
         <p:nvSpPr>
-          <p:cNvPr id="5" name="TextBox 4"/>
+          <p:cNvPr id="23" name="TextBox 22"/>
           <p:cNvSpPr txBox="1"/>
           <p:nvPr/>
         </p:nvSpPr>
         <p:spPr>
           <a:xfrm>
-            <a:off x="2489641" y="668710"/>
-            <a:ext cx="923450" cy="461665"/>
+            <a:off x="1802380" y="676739"/>
+            <a:ext cx="800219" cy="400110"/>
           </a:xfrm>
           <a:prstGeom prst="rect">
             <a:avLst/>
@@ -3216,7 +3209,7 @@
           <a:p>
             <a:pPr algn="ctr"/>
             <a:r>
-              <a:rPr lang="en-US" sz="1200" dirty="0">
+              <a:rPr lang="en-US" sz="1000" dirty="0" smtClean="0">
                 <a:latin typeface="Courier New"/>
                 <a:cs typeface="Courier New"/>
               </a:rPr>
@@ -3226,14 +3219,14 @@
           <a:p>
             <a:pPr algn="ctr"/>
             <a:r>
-              <a:rPr lang="en-US" sz="1200" dirty="0">
+              <a:rPr lang="en-US" sz="1000" dirty="0" smtClean="0">
                 <a:latin typeface="Courier New"/>
                 <a:cs typeface="Courier New"/>
               </a:rPr>
               <a:t>(</a:t>
             </a:r>
             <a:r>
-              <a:rPr lang="en-US" sz="1200" dirty="0">
+              <a:rPr lang="en-US" sz="1000" dirty="0" smtClean="0">
                 <a:solidFill>
                   <a:schemeClr val="tx2">
                     <a:lumMod val="60000"/>
@@ -3246,13 +3239,13 @@
               <a:t>uint32</a:t>
             </a:r>
             <a:r>
-              <a:rPr lang="en-US" sz="1200" dirty="0">
+              <a:rPr lang="en-US" sz="1000" dirty="0" smtClean="0">
                 <a:latin typeface="Courier New"/>
                 <a:cs typeface="Courier New"/>
               </a:rPr>
               <a:t>)</a:t>
             </a:r>
-            <a:endParaRPr lang="en-US" sz="1200" dirty="0">
+            <a:endParaRPr lang="en-US" sz="1000" dirty="0">
               <a:latin typeface="Courier New"/>
               <a:cs typeface="Courier New"/>
             </a:endParaRPr>
@@ -3261,14 +3254,14 @@
       </p:sp>
       <p:sp>
         <p:nvSpPr>
-          <p:cNvPr id="8" name="TextBox 7"/>
+          <p:cNvPr id="24" name="TextBox 23"/>
           <p:cNvSpPr txBox="1"/>
           <p:nvPr/>
         </p:nvSpPr>
         <p:spPr>
           <a:xfrm>
-            <a:off x="1763474" y="1965895"/>
-            <a:ext cx="1207382" cy="461665"/>
+            <a:off x="2387414" y="2965502"/>
+            <a:ext cx="2258574" cy="415498"/>
           </a:xfrm>
           <a:prstGeom prst="rect">
             <a:avLst/>
@@ -3278,26 +3271,34 @@
             <a:solidFill>
               <a:schemeClr val="tx1"/>
             </a:solidFill>
+            <a:prstDash val="solid"/>
           </a:ln>
         </p:spPr>
         <p:txBody>
-          <a:bodyPr wrap="none" rtlCol="0">
+          <a:bodyPr wrap="square" rtlCol="0">
             <a:spAutoFit/>
           </a:bodyPr>
           <a:lstStyle/>
           <a:p>
             <a:pPr algn="ctr"/>
             <a:r>
-              <a:rPr lang="en-US" sz="1200" dirty="0">
+              <a:rPr lang="en-US" sz="1050" dirty="0" smtClean="0">
                 <a:latin typeface="Courier New"/>
                 <a:cs typeface="Courier New"/>
               </a:rPr>
-              <a:t>Binary glTF</a:t>
+              <a:t>Binary </a:t>
+            </a:r>
+            <a:r>
+              <a:rPr lang="en-US" sz="1050" dirty="0" smtClean="0">
+                <a:latin typeface="Courier New"/>
+                <a:cs typeface="Courier New"/>
+              </a:rPr>
+              <a:t>glTF</a:t>
             </a:r>
           </a:p>
           <a:p>
             <a:pPr algn="ctr"/>
-            <a:endParaRPr lang="en-US" sz="1200" dirty="0">
+            <a:endParaRPr lang="en-US" sz="1050" dirty="0" smtClean="0">
               <a:latin typeface="Courier New"/>
               <a:cs typeface="Courier New"/>
             </a:endParaRPr>
@@ -3306,18 +3307,19 @@
       </p:sp>
       <p:sp>
         <p:nvSpPr>
-          <p:cNvPr id="11" name="Oval 10"/>
+          <p:cNvPr id="25" name="Oval 24"/>
           <p:cNvSpPr/>
           <p:nvPr/>
         </p:nvSpPr>
         <p:spPr>
           <a:xfrm>
-            <a:off x="1692813" y="2818493"/>
+            <a:off x="2844223" y="3818101"/>
             <a:ext cx="1342573" cy="616860"/>
           </a:xfrm>
           <a:prstGeom prst="ellipse">
             <a:avLst/>
           </a:prstGeom>
+          <a:noFill/>
           <a:ln w="12700" cmpd="sng">
             <a:prstDash val="lgDash"/>
           </a:ln>
@@ -3342,13 +3344,13 @@
           <a:p>
             <a:pPr algn="ctr"/>
             <a:r>
-              <a:rPr lang="en-US" sz="1200" dirty="0">
+              <a:rPr lang="en-US" sz="1050" dirty="0" smtClean="0">
                 <a:latin typeface="Courier New"/>
                 <a:cs typeface="Courier New"/>
               </a:rPr>
               <a:t>External data</a:t>
             </a:r>
-            <a:endParaRPr lang="en-US" sz="1200" dirty="0">
+            <a:endParaRPr lang="en-US" sz="1050" dirty="0">
               <a:latin typeface="Courier New"/>
               <a:cs typeface="Courier New"/>
             </a:endParaRPr>
@@ -3357,14 +3359,14 @@
       </p:sp>
       <p:cxnSp>
         <p:nvCxnSpPr>
-          <p:cNvPr id="13" name="Straight Arrow Connector 12"/>
+          <p:cNvPr id="26" name="Straight Arrow Connector 25"/>
           <p:cNvCxnSpPr/>
           <p:nvPr/>
         </p:nvCxnSpPr>
         <p:spPr>
           <a:xfrm>
-            <a:off x="642711" y="405940"/>
-            <a:ext cx="10116697" cy="0"/>
+            <a:off x="220177" y="398799"/>
+            <a:ext cx="7860847" cy="0"/>
           </a:xfrm>
           <a:prstGeom prst="straightConnector1">
             <a:avLst/>
@@ -3394,14 +3396,14 @@
       </p:cxnSp>
       <p:sp>
         <p:nvSpPr>
-          <p:cNvPr id="14" name="TextBox 13"/>
+          <p:cNvPr id="27" name="TextBox 26"/>
           <p:cNvSpPr txBox="1"/>
           <p:nvPr/>
         </p:nvSpPr>
         <p:spPr>
           <a:xfrm>
-            <a:off x="4743248" y="128942"/>
-            <a:ext cx="1486305" cy="276999"/>
+            <a:off x="2982592" y="135816"/>
+            <a:ext cx="2569934" cy="246221"/>
           </a:xfrm>
           <a:prstGeom prst="rect">
             <a:avLst/>
@@ -3420,13 +3422,27 @@
           <a:p>
             <a:pPr algn="ctr"/>
             <a:r>
-              <a:rPr lang="en-US" sz="1200" dirty="0">
+              <a:rPr lang="en-US" sz="1000" dirty="0" smtClean="0">
                 <a:latin typeface="Courier New"/>
                 <a:cs typeface="Courier New"/>
               </a:rPr>
-              <a:t>24-byte header</a:t>
-            </a:r>
-            <a:endParaRPr lang="en-US" sz="1200" dirty="0">
+              <a:t>28</a:t>
+            </a:r>
+            <a:r>
+              <a:rPr lang="en-US" sz="1000" dirty="0" smtClean="0">
+                <a:latin typeface="Courier New"/>
+                <a:cs typeface="Courier New"/>
+              </a:rPr>
+              <a:t>-byte </a:t>
+            </a:r>
+            <a:r>
+              <a:rPr lang="en-US" sz="1000" dirty="0" smtClean="0">
+                <a:latin typeface="Courier New"/>
+                <a:cs typeface="Courier New"/>
+              </a:rPr>
+              <a:t>header (first 20 bytes)</a:t>
+            </a:r>
+            <a:endParaRPr lang="en-US" sz="1000" dirty="0">
               <a:latin typeface="Courier New"/>
               <a:cs typeface="Courier New"/>
             </a:endParaRPr>
@@ -3435,17 +3451,17 @@
       </p:sp>
       <p:cxnSp>
         <p:nvCxnSpPr>
-          <p:cNvPr id="35" name="Straight Arrow Connector 34"/>
+          <p:cNvPr id="28" name="Straight Arrow Connector 27"/>
           <p:cNvCxnSpPr>
-            <a:stCxn id="8" idx="2"/>
-            <a:endCxn id="11" idx="0"/>
+            <a:stCxn id="24" idx="2"/>
+            <a:endCxn id="25" idx="0"/>
           </p:cNvCxnSpPr>
           <p:nvPr/>
         </p:nvCxnSpPr>
         <p:spPr>
           <a:xfrm flipH="1">
-            <a:off x="2364100" y="2427560"/>
-            <a:ext cx="3065" cy="390933"/>
+            <a:off x="3515510" y="3381000"/>
+            <a:ext cx="1191" cy="437101"/>
           </a:xfrm>
           <a:prstGeom prst="straightConnector1">
             <a:avLst/>
@@ -3475,14 +3491,14 @@
       </p:cxnSp>
       <p:sp>
         <p:nvSpPr>
-          <p:cNvPr id="18" name="TextBox 17"/>
+          <p:cNvPr id="29" name="TextBox 28"/>
           <p:cNvSpPr txBox="1"/>
           <p:nvPr/>
         </p:nvSpPr>
         <p:spPr>
           <a:xfrm>
-            <a:off x="4533344" y="668709"/>
-            <a:ext cx="2416046" cy="461665"/>
+            <a:off x="3556707" y="676739"/>
+            <a:ext cx="2185214" cy="400110"/>
           </a:xfrm>
           <a:prstGeom prst="rect">
             <a:avLst/>
@@ -3502,13 +3518,13 @@
           <a:p>
             <a:pPr algn="ctr"/>
             <a:r>
-              <a:rPr lang="en-US" sz="1200" dirty="0" smtClean="0">
+              <a:rPr lang="en-US" sz="1000" dirty="0" err="1" smtClean="0">
                 <a:latin typeface="Courier New"/>
                 <a:cs typeface="Courier New"/>
               </a:rPr>
-              <a:t>batchTableJSONByteLength</a:t>
-            </a:r>
-            <a:endParaRPr lang="en-US" sz="1200" dirty="0">
+              <a:t>featureTableJSONByteLength</a:t>
+            </a:r>
+            <a:endParaRPr lang="en-US" sz="1000" dirty="0" smtClean="0">
               <a:latin typeface="Courier New"/>
               <a:cs typeface="Courier New"/>
             </a:endParaRPr>
@@ -3516,14 +3532,14 @@
           <a:p>
             <a:pPr algn="ctr"/>
             <a:r>
-              <a:rPr lang="en-US" sz="1200" dirty="0">
+              <a:rPr lang="en-US" sz="1000" dirty="0" smtClean="0">
                 <a:latin typeface="Courier New"/>
                 <a:cs typeface="Courier New"/>
               </a:rPr>
               <a:t>(</a:t>
             </a:r>
             <a:r>
-              <a:rPr lang="en-US" sz="1200" dirty="0">
+              <a:rPr lang="en-US" sz="1000" dirty="0" smtClean="0">
                 <a:solidFill>
                   <a:schemeClr val="tx2">
                     <a:lumMod val="60000"/>
@@ -3536,13 +3552,13 @@
               <a:t>uint32</a:t>
             </a:r>
             <a:r>
-              <a:rPr lang="en-US" sz="1200" dirty="0">
+              <a:rPr lang="en-US" sz="1000" dirty="0" smtClean="0">
                 <a:latin typeface="Courier New"/>
                 <a:cs typeface="Courier New"/>
               </a:rPr>
               <a:t>)</a:t>
             </a:r>
-            <a:endParaRPr lang="en-US" sz="1200" dirty="0">
+            <a:endParaRPr lang="en-US" sz="1000" dirty="0">
               <a:latin typeface="Courier New"/>
               <a:cs typeface="Courier New"/>
             </a:endParaRPr>
@@ -3551,14 +3567,14 @@
       </p:sp>
       <p:sp>
         <p:nvSpPr>
-          <p:cNvPr id="19" name="TextBox 18"/>
+          <p:cNvPr id="30" name="TextBox 29"/>
           <p:cNvSpPr txBox="1"/>
           <p:nvPr/>
         </p:nvSpPr>
         <p:spPr>
           <a:xfrm>
-            <a:off x="642711" y="1965895"/>
-            <a:ext cx="1114408" cy="461665"/>
+            <a:off x="1401247" y="2965502"/>
+            <a:ext cx="986167" cy="415498"/>
           </a:xfrm>
           <a:prstGeom prst="rect">
             <a:avLst/>
@@ -3579,7 +3595,7 @@
           <a:p>
             <a:pPr algn="ctr"/>
             <a:r>
-              <a:rPr lang="en-US" sz="1200" dirty="0">
+              <a:rPr lang="en-US" sz="1050" dirty="0" smtClean="0">
                 <a:latin typeface="Courier New"/>
                 <a:cs typeface="Courier New"/>
               </a:rPr>
@@ -3588,7 +3604,7 @@
           </a:p>
           <a:p>
             <a:pPr algn="ctr"/>
-            <a:endParaRPr lang="en-US" sz="1200" dirty="0">
+            <a:endParaRPr lang="en-US" sz="1050" dirty="0">
               <a:latin typeface="Courier New"/>
               <a:cs typeface="Courier New"/>
             </a:endParaRPr>
@@ -3597,14 +3613,14 @@
       </p:sp>
       <p:sp>
         <p:nvSpPr>
-          <p:cNvPr id="12" name="TextBox 11"/>
+          <p:cNvPr id="31" name="TextBox 30"/>
           <p:cNvSpPr txBox="1"/>
           <p:nvPr/>
         </p:nvSpPr>
         <p:spPr>
           <a:xfrm>
-            <a:off x="3413091" y="668710"/>
-            <a:ext cx="1114408" cy="461665"/>
+            <a:off x="2602599" y="676739"/>
+            <a:ext cx="954108" cy="400110"/>
           </a:xfrm>
           <a:prstGeom prst="rect">
             <a:avLst/>
@@ -3624,24 +3640,28 @@
           <a:p>
             <a:pPr algn="ctr"/>
             <a:r>
-              <a:rPr lang="en-US" sz="1200" dirty="0">
+              <a:rPr lang="en-US" sz="1000" dirty="0" err="1" smtClean="0">
                 <a:latin typeface="Courier New"/>
                 <a:cs typeface="Courier New"/>
               </a:rPr>
               <a:t>byteLength</a:t>
             </a:r>
+            <a:endParaRPr lang="en-US" sz="1000" dirty="0" smtClean="0">
+              <a:latin typeface="Courier New"/>
+              <a:cs typeface="Courier New"/>
+            </a:endParaRPr>
           </a:p>
           <a:p>
             <a:pPr algn="ctr"/>
             <a:r>
-              <a:rPr lang="en-US" sz="1200" dirty="0">
+              <a:rPr lang="en-US" sz="1000" dirty="0" smtClean="0">
                 <a:latin typeface="Courier New"/>
                 <a:cs typeface="Courier New"/>
               </a:rPr>
               <a:t>(</a:t>
             </a:r>
             <a:r>
-              <a:rPr lang="en-US" sz="1200" dirty="0">
+              <a:rPr lang="en-US" sz="1000" dirty="0" smtClean="0">
                 <a:solidFill>
                   <a:schemeClr val="tx2">
                     <a:lumMod val="60000"/>
@@ -3654,13 +3674,13 @@
               <a:t>uint32</a:t>
             </a:r>
             <a:r>
-              <a:rPr lang="en-US" sz="1200" dirty="0">
+              <a:rPr lang="en-US" sz="1000" dirty="0" smtClean="0">
                 <a:latin typeface="Courier New"/>
                 <a:cs typeface="Courier New"/>
               </a:rPr>
               <a:t>)</a:t>
             </a:r>
-            <a:endParaRPr lang="en-US" sz="1200" dirty="0">
+            <a:endParaRPr lang="en-US" sz="1000" dirty="0">
               <a:latin typeface="Courier New"/>
               <a:cs typeface="Courier New"/>
             </a:endParaRPr>
@@ -3669,14 +3689,14 @@
       </p:sp>
       <p:sp>
         <p:nvSpPr>
-          <p:cNvPr id="15" name="TextBox 14"/>
+          <p:cNvPr id="32" name="TextBox 31"/>
           <p:cNvSpPr txBox="1"/>
           <p:nvPr/>
         </p:nvSpPr>
         <p:spPr>
           <a:xfrm>
-            <a:off x="9551385" y="668707"/>
-            <a:ext cx="1207382" cy="461665"/>
+            <a:off x="5741921" y="674777"/>
+            <a:ext cx="2339103" cy="400110"/>
           </a:xfrm>
           <a:prstGeom prst="rect">
             <a:avLst/>
@@ -3696,24 +3716,28 @@
           <a:p>
             <a:pPr algn="ctr"/>
             <a:r>
-              <a:rPr lang="en-US" sz="1200" dirty="0">
+              <a:rPr lang="en-US" sz="1000" dirty="0" err="1" smtClean="0">
                 <a:latin typeface="Courier New"/>
                 <a:cs typeface="Courier New"/>
               </a:rPr>
-              <a:t>batchLength</a:t>
-            </a:r>
+              <a:t>featureTableBinaryByteLength</a:t>
+            </a:r>
+            <a:endParaRPr lang="en-US" sz="1000" dirty="0" smtClean="0">
+              <a:latin typeface="Courier New"/>
+              <a:cs typeface="Courier New"/>
+            </a:endParaRPr>
           </a:p>
           <a:p>
             <a:pPr algn="ctr"/>
             <a:r>
-              <a:rPr lang="en-US" sz="1200" dirty="0">
+              <a:rPr lang="en-US" sz="1000" dirty="0" smtClean="0">
                 <a:latin typeface="Courier New"/>
                 <a:cs typeface="Courier New"/>
               </a:rPr>
               <a:t>(</a:t>
             </a:r>
             <a:r>
-              <a:rPr lang="en-US" sz="1200" dirty="0">
+              <a:rPr lang="en-US" sz="1000" dirty="0" smtClean="0">
                 <a:solidFill>
                   <a:schemeClr val="tx2">
                     <a:lumMod val="60000"/>
@@ -3726,29 +3750,122 @@
               <a:t>uint32</a:t>
             </a:r>
             <a:r>
-              <a:rPr lang="en-US" sz="1200" dirty="0">
+              <a:rPr lang="en-US" sz="1000" dirty="0" smtClean="0">
                 <a:latin typeface="Courier New"/>
                 <a:cs typeface="Courier New"/>
               </a:rPr>
               <a:t>)</a:t>
             </a:r>
-            <a:endParaRPr lang="en-US" sz="1200" dirty="0">
+            <a:endParaRPr lang="en-US" sz="1000" dirty="0">
               <a:latin typeface="Courier New"/>
               <a:cs typeface="Courier New"/>
             </a:endParaRPr>
           </a:p>
         </p:txBody>
       </p:sp>
+      <p:sp>
+        <p:nvSpPr>
+          <p:cNvPr id="33" name="TextBox 32"/>
+          <p:cNvSpPr txBox="1"/>
+          <p:nvPr/>
+        </p:nvSpPr>
+        <p:spPr>
+          <a:xfrm>
+            <a:off x="8081024" y="686138"/>
+            <a:ext cx="269625" cy="430887"/>
+          </a:xfrm>
+          <a:prstGeom prst="rect">
+            <a:avLst/>
+          </a:prstGeom>
+          <a:noFill/>
+          <a:ln w="12700" cmpd="sng">
+            <a:noFill/>
+          </a:ln>
+        </p:spPr>
+        <p:txBody>
+          <a:bodyPr wrap="none" rtlCol="0">
+            <a:spAutoFit/>
+          </a:bodyPr>
+          <a:lstStyle/>
+          <a:p>
+            <a:pPr algn="ctr"/>
+            <a:r>
+              <a:rPr lang="en-US" sz="1050" dirty="0" smtClean="0">
+                <a:latin typeface="Courier New"/>
+                <a:cs typeface="Courier New"/>
+              </a:rPr>
+              <a:t>…</a:t>
+            </a:r>
+          </a:p>
+          <a:p>
+            <a:pPr algn="ctr"/>
+            <a:endParaRPr lang="en-US" sz="1050" dirty="0" smtClean="0">
+              <a:latin typeface="Courier New"/>
+              <a:cs typeface="Courier New"/>
+            </a:endParaRPr>
+          </a:p>
+        </p:txBody>
+      </p:sp>
+      <p:sp>
+        <p:nvSpPr>
+          <p:cNvPr id="34" name="TextBox 33"/>
+          <p:cNvSpPr txBox="1"/>
+          <p:nvPr/>
+        </p:nvSpPr>
+        <p:spPr>
+          <a:xfrm>
+            <a:off x="254779" y="2965502"/>
+            <a:ext cx="1146468" cy="415498"/>
+          </a:xfrm>
+          <a:prstGeom prst="rect">
+            <a:avLst/>
+          </a:prstGeom>
+          <a:noFill/>
+          <a:ln w="12700" cmpd="sng">
+            <a:solidFill>
+              <a:schemeClr val="tx1"/>
+            </a:solidFill>
+            <a:prstDash val="lgDash"/>
+          </a:ln>
+        </p:spPr>
+        <p:txBody>
+          <a:bodyPr wrap="none" rtlCol="0">
+            <a:spAutoFit/>
+          </a:bodyPr>
+          <a:lstStyle/>
+          <a:p>
+            <a:pPr algn="ctr"/>
+            <a:r>
+              <a:rPr lang="en-US" sz="1050" dirty="0" err="1" smtClean="0">
+                <a:latin typeface="Courier New"/>
+                <a:cs typeface="Courier New"/>
+              </a:rPr>
+              <a:t>featureTable</a:t>
+            </a:r>
+            <a:endParaRPr lang="en-US" sz="1050" dirty="0" smtClean="0">
+              <a:latin typeface="Courier New"/>
+              <a:cs typeface="Courier New"/>
+            </a:endParaRPr>
+          </a:p>
+          <a:p>
+            <a:pPr algn="ctr"/>
+            <a:endParaRPr lang="en-US" sz="1050" dirty="0" smtClean="0">
+              <a:latin typeface="Courier New"/>
+              <a:cs typeface="Courier New"/>
+            </a:endParaRPr>
+          </a:p>
+        </p:txBody>
+      </p:sp>
       <p:cxnSp>
         <p:nvCxnSpPr>
-          <p:cNvPr id="16" name="Straight Arrow Connector 15"/>
+          <p:cNvPr id="36" name="Straight Arrow Connector 35"/>
           <p:cNvCxnSpPr/>
           <p:nvPr/>
         </p:nvCxnSpPr>
         <p:spPr>
           <a:xfrm>
-            <a:off x="642711" y="1705112"/>
-            <a:ext cx="2321270" cy="0"/>
+            <a:off x="250294" y="2732867"/>
+            <a:ext cx="4395694" cy="0"/>
           </a:xfrm>
           <a:prstGeom prst="straightConnector1">
             <a:avLst/>
@@ -3778,14 +3895,14 @@
       </p:cxnSp>
       <p:sp>
         <p:nvSpPr>
-          <p:cNvPr id="17" name="TextBox 16"/>
+          <p:cNvPr id="37" name="TextBox 36"/>
           <p:cNvSpPr txBox="1"/>
           <p:nvPr/>
         </p:nvSpPr>
         <p:spPr>
           <a:xfrm>
-            <a:off x="1525065" y="1365617"/>
-            <a:ext cx="556563" cy="276999"/>
+            <a:off x="2131196" y="2475993"/>
+            <a:ext cx="492443" cy="246221"/>
           </a:xfrm>
           <a:prstGeom prst="rect">
             <a:avLst/>
@@ -3797,36 +3914,149 @@
           </a:ln>
         </p:spPr>
         <p:txBody>
-          <a:bodyPr wrap="square" rtlCol="0">
+          <a:bodyPr wrap="none" rtlCol="0">
             <a:spAutoFit/>
           </a:bodyPr>
           <a:lstStyle/>
           <a:p>
             <a:pPr algn="ctr"/>
             <a:r>
-              <a:rPr lang="en-US" sz="1200" dirty="0">
+              <a:rPr lang="en-US" sz="1000" dirty="0" smtClean="0">
                 <a:latin typeface="Courier New"/>
                 <a:cs typeface="Courier New"/>
               </a:rPr>
               <a:t>body</a:t>
             </a:r>
-            <a:endParaRPr lang="en-US" sz="1200" dirty="0">
+            <a:endParaRPr lang="en-US" sz="1000" dirty="0">
               <a:latin typeface="Courier New"/>
               <a:cs typeface="Courier New"/>
             </a:endParaRPr>
           </a:p>
         </p:txBody>
       </p:sp>
-      <p:sp>
-        <p:nvSpPr>
-          <p:cNvPr id="20" name="TextBox 19"/>
+      <p:cxnSp>
+        <p:nvCxnSpPr>
+          <p:cNvPr id="38" name="Straight Arrow Connector 37"/>
+          <p:cNvCxnSpPr/>
+          <p:nvPr/>
+        </p:nvCxnSpPr>
+        <p:spPr>
+          <a:xfrm>
+            <a:off x="220177" y="1540274"/>
+            <a:ext cx="4217863" cy="0"/>
+          </a:xfrm>
+          <a:prstGeom prst="straightConnector1">
+            <a:avLst/>
+          </a:prstGeom>
+          <a:ln w="12700" cmpd="sng">
+            <a:solidFill>
+              <a:schemeClr val="tx1"/>
+            </a:solidFill>
+            <a:headEnd type="arrow"/>
+            <a:tailEnd type="arrow"/>
+          </a:ln>
+        </p:spPr>
+        <p:style>
+          <a:lnRef idx="2">
+            <a:schemeClr val="accent1"/>
+          </a:lnRef>
+          <a:fillRef idx="0">
+            <a:schemeClr val="accent1"/>
+          </a:fillRef>
+          <a:effectRef idx="1">
+            <a:schemeClr val="accent1"/>
+          </a:effectRef>
+          <a:fontRef idx="minor">
+            <a:schemeClr val="tx1"/>
+          </a:fontRef>
+        </p:style>
+      </p:cxnSp>
+      <p:sp>
+        <p:nvSpPr>
+          <p:cNvPr id="39" name="TextBox 38"/>
           <p:cNvSpPr txBox="1"/>
           <p:nvPr/>
         </p:nvSpPr>
         <p:spPr>
           <a:xfrm>
-            <a:off x="6949390" y="668708"/>
-            <a:ext cx="2601995" cy="461665"/>
+            <a:off x="1631120" y="1287261"/>
+            <a:ext cx="2416047" cy="246221"/>
+          </a:xfrm>
+          <a:prstGeom prst="rect">
+            <a:avLst/>
+          </a:prstGeom>
+          <a:noFill/>
+          <a:ln w="12700" cmpd="sng">
+            <a:noFill/>
+            <a:prstDash val="lgDash"/>
+          </a:ln>
+        </p:spPr>
+        <p:txBody>
+          <a:bodyPr wrap="none" rtlCol="0">
+            <a:spAutoFit/>
+          </a:bodyPr>
+          <a:lstStyle/>
+          <a:p>
+            <a:pPr algn="ctr"/>
+            <a:r>
+              <a:rPr lang="en-US" sz="1000" dirty="0" smtClean="0">
+                <a:latin typeface="Courier New"/>
+                <a:cs typeface="Courier New"/>
+              </a:rPr>
+              <a:t>28</a:t>
+            </a:r>
+            <a:r>
+              <a:rPr lang="en-US" sz="1000" dirty="0" smtClean="0">
+                <a:latin typeface="Courier New"/>
+                <a:cs typeface="Courier New"/>
+              </a:rPr>
+              <a:t>-byte </a:t>
+            </a:r>
+            <a:r>
+              <a:rPr lang="en-US" sz="1000" dirty="0" smtClean="0">
+                <a:latin typeface="Courier New"/>
+                <a:cs typeface="Courier New"/>
+              </a:rPr>
+              <a:t>header (next </a:t>
+            </a:r>
+            <a:r>
+              <a:rPr lang="en-US" sz="1000" dirty="0">
+                <a:latin typeface="Courier New"/>
+                <a:cs typeface="Courier New"/>
+              </a:rPr>
+              <a:t>8</a:t>
+            </a:r>
+            <a:r>
+              <a:rPr lang="en-US" sz="1000" dirty="0" smtClean="0">
+                <a:latin typeface="Courier New"/>
+                <a:cs typeface="Courier New"/>
+              </a:rPr>
+              <a:t> </a:t>
+            </a:r>
+            <a:r>
+              <a:rPr lang="en-US" sz="1000" dirty="0" smtClean="0">
+                <a:latin typeface="Courier New"/>
+                <a:cs typeface="Courier New"/>
+              </a:rPr>
+              <a:t>bytes)</a:t>
+            </a:r>
+            <a:endParaRPr lang="en-US" sz="1000" dirty="0">
+              <a:latin typeface="Courier New"/>
+              <a:cs typeface="Courier New"/>
+            </a:endParaRPr>
+          </a:p>
+        </p:txBody>
+      </p:sp>
+      <p:sp>
+        <p:nvSpPr>
+          <p:cNvPr id="40" name="TextBox 39"/>
+          <p:cNvSpPr txBox="1"/>
+          <p:nvPr/>
+        </p:nvSpPr>
+        <p:spPr>
+          <a:xfrm>
+            <a:off x="229919" y="1858284"/>
+            <a:ext cx="2031325" cy="400110"/>
           </a:xfrm>
           <a:prstGeom prst="rect">
             <a:avLst/>
@@ -3846,20 +4076,13 @@
           <a:p>
             <a:pPr algn="ctr"/>
             <a:r>
-              <a:rPr lang="en-US" sz="1200" dirty="0" smtClean="0">
+              <a:rPr lang="en-US" sz="1000" dirty="0" err="1" smtClean="0">
                 <a:latin typeface="Courier New"/>
                 <a:cs typeface="Courier New"/>
               </a:rPr>
-              <a:t>batch</a:t>
-            </a:r>
-            <a:r>
-              <a:rPr lang="en-US" sz="1200" dirty="0" smtClean="0">
-                <a:latin typeface="Courier New"/>
-                <a:cs typeface="Courier New"/>
-              </a:rPr>
-              <a:t>TableBinaryByteLength</a:t>
-            </a:r>
-            <a:endParaRPr lang="en-US" sz="1200" dirty="0">
+              <a:t>batchTableJSONByteLength</a:t>
+            </a:r>
+            <a:endParaRPr lang="en-US" sz="1000" dirty="0" smtClean="0">
               <a:latin typeface="Courier New"/>
               <a:cs typeface="Courier New"/>
             </a:endParaRPr>
@@ -3867,14 +4090,14 @@
           <a:p>
             <a:pPr algn="ctr"/>
             <a:r>
-              <a:rPr lang="en-US" sz="1200" dirty="0">
+              <a:rPr lang="en-US" sz="1000" dirty="0" smtClean="0">
                 <a:latin typeface="Courier New"/>
                 <a:cs typeface="Courier New"/>
               </a:rPr>
               <a:t>(</a:t>
             </a:r>
             <a:r>
-              <a:rPr lang="en-US" sz="1200" dirty="0">
+              <a:rPr lang="en-US" sz="1000" dirty="0" smtClean="0">
                 <a:solidFill>
                   <a:schemeClr val="tx2">
                     <a:lumMod val="60000"/>
@@ -3887,12 +4110,135 @@
               <a:t>uint32</a:t>
             </a:r>
             <a:r>
-              <a:rPr lang="en-US" sz="1200" dirty="0">
+              <a:rPr lang="en-US" sz="1000" dirty="0" smtClean="0">
                 <a:latin typeface="Courier New"/>
                 <a:cs typeface="Courier New"/>
               </a:rPr>
               <a:t>)</a:t>
             </a:r>
+            <a:endParaRPr lang="en-US" sz="1000" dirty="0">
+              <a:latin typeface="Courier New"/>
+              <a:cs typeface="Courier New"/>
+            </a:endParaRPr>
+          </a:p>
+        </p:txBody>
+      </p:sp>
+      <p:sp>
+        <p:nvSpPr>
+          <p:cNvPr id="41" name="TextBox 40"/>
+          <p:cNvSpPr txBox="1"/>
+          <p:nvPr/>
+        </p:nvSpPr>
+        <p:spPr>
+          <a:xfrm>
+            <a:off x="2261244" y="1858875"/>
+            <a:ext cx="2185214" cy="400110"/>
+          </a:xfrm>
+          <a:prstGeom prst="rect">
+            <a:avLst/>
+          </a:prstGeom>
+          <a:noFill/>
+          <a:ln w="12700" cmpd="sng">
+            <a:solidFill>
+              <a:schemeClr val="tx1"/>
+            </a:solidFill>
+          </a:ln>
+        </p:spPr>
+        <p:txBody>
+          <a:bodyPr wrap="none" rtlCol="0">
+            <a:spAutoFit/>
+          </a:bodyPr>
+          <a:lstStyle/>
+          <a:p>
+            <a:pPr algn="ctr"/>
+            <a:r>
+              <a:rPr lang="en-US" sz="1000" dirty="0" err="1" smtClean="0">
+                <a:latin typeface="Courier New"/>
+                <a:cs typeface="Courier New"/>
+              </a:rPr>
+              <a:t>batchTableBinaryByteLength</a:t>
+            </a:r>
+            <a:endParaRPr lang="en-US" sz="1000" dirty="0" smtClean="0">
+              <a:latin typeface="Courier New"/>
+              <a:cs typeface="Courier New"/>
+            </a:endParaRPr>
+          </a:p>
+          <a:p>
+            <a:pPr algn="ctr"/>
+            <a:r>
+              <a:rPr lang="en-US" sz="1000" dirty="0" smtClean="0">
+                <a:latin typeface="Courier New"/>
+                <a:cs typeface="Courier New"/>
+              </a:rPr>
+              <a:t>(</a:t>
+            </a:r>
+            <a:r>
+              <a:rPr lang="en-US" sz="1000" dirty="0" smtClean="0">
+                <a:solidFill>
+                  <a:schemeClr val="tx2">
+                    <a:lumMod val="60000"/>
+                    <a:lumOff val="40000"/>
+                  </a:schemeClr>
+                </a:solidFill>
+                <a:latin typeface="Courier New"/>
+                <a:cs typeface="Courier New"/>
+              </a:rPr>
+              <a:t>uint32</a:t>
+            </a:r>
+            <a:r>
+              <a:rPr lang="en-US" sz="1000" dirty="0" smtClean="0">
+                <a:latin typeface="Courier New"/>
+                <a:cs typeface="Courier New"/>
+              </a:rPr>
+              <a:t>)</a:t>
+            </a:r>
+            <a:endParaRPr lang="en-US" sz="1000" dirty="0">
+              <a:latin typeface="Courier New"/>
+              <a:cs typeface="Courier New"/>
+            </a:endParaRPr>
+          </a:p>
+        </p:txBody>
+      </p:sp>
+      <p:sp>
+        <p:nvSpPr>
+          <p:cNvPr id="42" name="TextBox 41"/>
+          <p:cNvSpPr txBox="1"/>
+          <p:nvPr/>
+        </p:nvSpPr>
+        <p:spPr>
+          <a:xfrm>
+            <a:off x="4438040" y="1871131"/>
+            <a:ext cx="269625" cy="430887"/>
+          </a:xfrm>
+          <a:prstGeom prst="rect">
+            <a:avLst/>
+          </a:prstGeom>
+          <a:noFill/>
+          <a:ln w="12700" cmpd="sng">
+            <a:noFill/>
+          </a:ln>
+        </p:spPr>
+        <p:txBody>
+          <a:bodyPr wrap="none" rtlCol="0">
+            <a:spAutoFit/>
+          </a:bodyPr>
+          <a:lstStyle/>
+          <a:p>
+            <a:pPr algn="ctr"/>
+            <a:r>
+              <a:rPr lang="en-US" sz="1050" dirty="0" smtClean="0">
+                <a:latin typeface="Courier New"/>
+                <a:cs typeface="Courier New"/>
+              </a:rPr>
+              <a:t>…</a:t>
+            </a:r>
+          </a:p>
+          <a:p>
+            <a:pPr algn="ctr"/>
+            <a:endParaRPr lang="en-US" sz="1050" dirty="0" smtClean="0">
+              <a:latin typeface="Courier New"/>
+              <a:cs typeface="Courier New"/>
+            </a:endParaRPr>
           </a:p>
         </p:txBody>
       </p:sp>

</xml_diff>